<commit_message>
slide deck (fine tuning stuff)
</commit_message>
<xml_diff>
--- a/Experiments.pptx
+++ b/Experiments.pptx
@@ -14,8 +14,9 @@
     <p:sldId id="322" r:id="rId8"/>
     <p:sldId id="260" r:id="rId9"/>
     <p:sldId id="321" r:id="rId10"/>
-    <p:sldId id="261" r:id="rId11"/>
-    <p:sldId id="323" r:id="rId12"/>
+    <p:sldId id="324" r:id="rId11"/>
+    <p:sldId id="261" r:id="rId12"/>
+    <p:sldId id="323" r:id="rId13"/>
   </p:sldIdLst>
   <p:sldSz cx="12192000" cy="6858000"/>
   <p:notesSz cx="6858000" cy="9144000"/>
@@ -114,6 +115,11 @@
       </a:defRPr>
     </a:lvl9pPr>
   </p:defaultTextStyle>
+  <p:extLst>
+    <p:ext uri="{EFAFB233-063F-42B5-8137-9DF3F51BA10A}">
+      <p15:sldGuideLst xmlns:p15="http://schemas.microsoft.com/office/powerpoint/2012/main"/>
+    </p:ext>
+  </p:extLst>
 </p:presentation>
 </file>
 
@@ -264,7 +270,7 @@
           <a:p>
             <a:fld id="{A99D5239-F08C-4643-B440-E380AF94EFE9}" type="datetimeFigureOut">
               <a:rPr lang="en-US" smtClean="0"/>
-              <a:t>4/22/24</a:t>
+              <a:t>4/24/24</a:t>
             </a:fld>
             <a:endParaRPr lang="en-US"/>
           </a:p>
@@ -462,7 +468,7 @@
           <a:p>
             <a:fld id="{A99D5239-F08C-4643-B440-E380AF94EFE9}" type="datetimeFigureOut">
               <a:rPr lang="en-US" smtClean="0"/>
-              <a:t>4/22/24</a:t>
+              <a:t>4/24/24</a:t>
             </a:fld>
             <a:endParaRPr lang="en-US"/>
           </a:p>
@@ -670,7 +676,7 @@
           <a:p>
             <a:fld id="{A99D5239-F08C-4643-B440-E380AF94EFE9}" type="datetimeFigureOut">
               <a:rPr lang="en-US" smtClean="0"/>
-              <a:t>4/22/24</a:t>
+              <a:t>4/24/24</a:t>
             </a:fld>
             <a:endParaRPr lang="en-US"/>
           </a:p>
@@ -868,7 +874,7 @@
           <a:p>
             <a:fld id="{A99D5239-F08C-4643-B440-E380AF94EFE9}" type="datetimeFigureOut">
               <a:rPr lang="en-US" smtClean="0"/>
-              <a:t>4/22/24</a:t>
+              <a:t>4/24/24</a:t>
             </a:fld>
             <a:endParaRPr lang="en-US"/>
           </a:p>
@@ -1143,7 +1149,7 @@
           <a:p>
             <a:fld id="{A99D5239-F08C-4643-B440-E380AF94EFE9}" type="datetimeFigureOut">
               <a:rPr lang="en-US" smtClean="0"/>
-              <a:t>4/22/24</a:t>
+              <a:t>4/24/24</a:t>
             </a:fld>
             <a:endParaRPr lang="en-US"/>
           </a:p>
@@ -1408,7 +1414,7 @@
           <a:p>
             <a:fld id="{A99D5239-F08C-4643-B440-E380AF94EFE9}" type="datetimeFigureOut">
               <a:rPr lang="en-US" smtClean="0"/>
-              <a:t>4/22/24</a:t>
+              <a:t>4/24/24</a:t>
             </a:fld>
             <a:endParaRPr lang="en-US"/>
           </a:p>
@@ -1820,7 +1826,7 @@
           <a:p>
             <a:fld id="{A99D5239-F08C-4643-B440-E380AF94EFE9}" type="datetimeFigureOut">
               <a:rPr lang="en-US" smtClean="0"/>
-              <a:t>4/22/24</a:t>
+              <a:t>4/24/24</a:t>
             </a:fld>
             <a:endParaRPr lang="en-US"/>
           </a:p>
@@ -1961,7 +1967,7 @@
           <a:p>
             <a:fld id="{A99D5239-F08C-4643-B440-E380AF94EFE9}" type="datetimeFigureOut">
               <a:rPr lang="en-US" smtClean="0"/>
-              <a:t>4/22/24</a:t>
+              <a:t>4/24/24</a:t>
             </a:fld>
             <a:endParaRPr lang="en-US"/>
           </a:p>
@@ -2074,7 +2080,7 @@
           <a:p>
             <a:fld id="{A99D5239-F08C-4643-B440-E380AF94EFE9}" type="datetimeFigureOut">
               <a:rPr lang="en-US" smtClean="0"/>
-              <a:t>4/22/24</a:t>
+              <a:t>4/24/24</a:t>
             </a:fld>
             <a:endParaRPr lang="en-US"/>
           </a:p>
@@ -2385,7 +2391,7 @@
           <a:p>
             <a:fld id="{A99D5239-F08C-4643-B440-E380AF94EFE9}" type="datetimeFigureOut">
               <a:rPr lang="en-US" smtClean="0"/>
-              <a:t>4/22/24</a:t>
+              <a:t>4/24/24</a:t>
             </a:fld>
             <a:endParaRPr lang="en-US"/>
           </a:p>
@@ -2673,7 +2679,7 @@
           <a:p>
             <a:fld id="{A99D5239-F08C-4643-B440-E380AF94EFE9}" type="datetimeFigureOut">
               <a:rPr lang="en-US" smtClean="0"/>
-              <a:t>4/22/24</a:t>
+              <a:t>4/24/24</a:t>
             </a:fld>
             <a:endParaRPr lang="en-US"/>
           </a:p>
@@ -2914,7 +2920,7 @@
           <a:p>
             <a:fld id="{A99D5239-F08C-4643-B440-E380AF94EFE9}" type="datetimeFigureOut">
               <a:rPr lang="en-US" smtClean="0"/>
-              <a:t>4/22/24</a:t>
+              <a:t>4/24/24</a:t>
             </a:fld>
             <a:endParaRPr lang="en-US"/>
           </a:p>
@@ -3885,6 +3891,558 @@
       </p:grpSpPr>
       <p:sp>
         <p:nvSpPr>
+          <p:cNvPr id="3" name="TextBox 2">
+            <a:extLst>
+              <a:ext uri="{FF2B5EF4-FFF2-40B4-BE49-F238E27FC236}">
+                <a16:creationId xmlns:a16="http://schemas.microsoft.com/office/drawing/2014/main" id="{DADAF6BF-3B4B-4B6A-1679-0DF3F3CCAEDD}"/>
+              </a:ext>
+            </a:extLst>
+          </p:cNvPr>
+          <p:cNvSpPr txBox="1"/>
+          <p:nvPr/>
+        </p:nvSpPr>
+        <p:spPr>
+          <a:xfrm>
+            <a:off x="585389" y="1508107"/>
+            <a:ext cx="7721849" cy="4401205"/>
+          </a:xfrm>
+          <a:prstGeom prst="rect">
+            <a:avLst/>
+          </a:prstGeom>
+          <a:noFill/>
+        </p:spPr>
+        <p:txBody>
+          <a:bodyPr wrap="square">
+            <a:spAutoFit/>
+          </a:bodyPr>
+          <a:lstStyle/>
+          <a:p>
+            <a:pPr marL="285750" indent="-285750">
+              <a:buFont typeface="Arial" panose="020B0604020202020204" pitchFamily="34" charset="0"/>
+              <a:buChar char="•"/>
+            </a:pPr>
+            <a:r>
+              <a:rPr lang="en-US" sz="1400" dirty="0"/>
+              <a:t>T</a:t>
+            </a:r>
+            <a:r>
+              <a:rPr lang="en-US" sz="1400" b="0" dirty="0">
+                <a:effectLst/>
+              </a:rPr>
+              <a:t>otal rows: 1109000</a:t>
+            </a:r>
+            <a:endParaRPr lang="en-US" sz="1400" dirty="0"/>
+          </a:p>
+          <a:p>
+            <a:pPr marL="285750" indent="-285750">
+              <a:buFont typeface="Arial" panose="020B0604020202020204" pitchFamily="34" charset="0"/>
+              <a:buChar char="•"/>
+            </a:pPr>
+            <a:r>
+              <a:rPr lang="en-US" sz="1400" b="0" dirty="0">
+                <a:effectLst/>
+              </a:rPr>
+              <a:t>Number of unique: 104972 (there are between 8-20 instances of each sequence)</a:t>
+            </a:r>
+          </a:p>
+          <a:p>
+            <a:pPr marL="285750" indent="-285750">
+              <a:buFont typeface="Arial" panose="020B0604020202020204" pitchFamily="34" charset="0"/>
+              <a:buChar char="•"/>
+            </a:pPr>
+            <a:endParaRPr lang="en-US" sz="1400" b="0" dirty="0">
+              <a:effectLst/>
+            </a:endParaRPr>
+          </a:p>
+          <a:p>
+            <a:pPr marL="285750" indent="-285750">
+              <a:buFont typeface="Arial" panose="020B0604020202020204" pitchFamily="34" charset="0"/>
+              <a:buChar char="•"/>
+            </a:pPr>
+            <a:r>
+              <a:rPr lang="en-US" sz="1400" b="0" dirty="0">
+                <a:effectLst/>
+              </a:rPr>
+              <a:t>Number of rows where </a:t>
+            </a:r>
+            <a:r>
+              <a:rPr lang="en-US" sz="1400" b="0" dirty="0" err="1">
+                <a:effectLst/>
+              </a:rPr>
+              <a:t>pred_Affinity</a:t>
+            </a:r>
+            <a:r>
+              <a:rPr lang="en-US" sz="1400" b="0" dirty="0">
+                <a:effectLst/>
+              </a:rPr>
+              <a:t> is not NAN : 340100</a:t>
+            </a:r>
+          </a:p>
+          <a:p>
+            <a:pPr marL="742950" lvl="1" indent="-285750">
+              <a:buFont typeface="Arial" panose="020B0604020202020204" pitchFamily="34" charset="0"/>
+              <a:buChar char="•"/>
+            </a:pPr>
+            <a:r>
+              <a:rPr lang="en-US" sz="1400" dirty="0"/>
+              <a:t>NANs are most likely non-binders (perhaps give them affinity 0?)</a:t>
+            </a:r>
+            <a:endParaRPr lang="en-US" sz="1400" b="0" dirty="0">
+              <a:effectLst/>
+            </a:endParaRPr>
+          </a:p>
+          <a:p>
+            <a:pPr marL="742950" lvl="1" indent="-285750">
+              <a:buFont typeface="Arial" panose="020B0604020202020204" pitchFamily="34" charset="0"/>
+              <a:buChar char="•"/>
+            </a:pPr>
+            <a:r>
+              <a:rPr lang="en-US" sz="1400" b="0" dirty="0">
+                <a:effectLst/>
+              </a:rPr>
+              <a:t>number of unique sequences in this subset: 87211</a:t>
+            </a:r>
+          </a:p>
+          <a:p>
+            <a:pPr marL="742950" lvl="1" indent="-285750">
+              <a:buFont typeface="Arial" panose="020B0604020202020204" pitchFamily="34" charset="0"/>
+              <a:buChar char="•"/>
+            </a:pPr>
+            <a:r>
+              <a:rPr lang="en-US" sz="1400" b="0" dirty="0">
+                <a:effectLst/>
+              </a:rPr>
+              <a:t>for each of these unique sequences, there are multiple binding affinity values</a:t>
+            </a:r>
+          </a:p>
+          <a:p>
+            <a:pPr marL="742950" lvl="1" indent="-285750">
+              <a:buFont typeface="Arial" panose="020B0604020202020204" pitchFamily="34" charset="0"/>
+              <a:buChar char="•"/>
+            </a:pPr>
+            <a:r>
+              <a:rPr lang="en-US" sz="1400" dirty="0"/>
+              <a:t>for example, </a:t>
+            </a:r>
+          </a:p>
+          <a:p>
+            <a:pPr marL="1200150" lvl="2" indent="-285750">
+              <a:buFont typeface="Arial" panose="020B0604020202020204" pitchFamily="34" charset="0"/>
+              <a:buChar char="•"/>
+            </a:pPr>
+            <a:r>
+              <a:rPr lang="en-US" sz="1400" b="0" dirty="0">
+                <a:effectLst/>
+              </a:rPr>
+              <a:t>seq 1: num affinity values = 6 , values: {</a:t>
+            </a:r>
+            <a:r>
+              <a:rPr lang="en-US" sz="1400" b="1" dirty="0">
+                <a:effectLst/>
+              </a:rPr>
+              <a:t>0.87</a:t>
+            </a:r>
+            <a:r>
+              <a:rPr lang="en-US" sz="1400" b="0" dirty="0">
+                <a:effectLst/>
+              </a:rPr>
+              <a:t>, 0.91, 0.96, </a:t>
+            </a:r>
+            <a:r>
+              <a:rPr lang="en-US" sz="1400" b="1" dirty="0">
+                <a:effectLst/>
+              </a:rPr>
+              <a:t>3.92</a:t>
+            </a:r>
+            <a:r>
+              <a:rPr lang="en-US" sz="1400" b="0" dirty="0">
+                <a:effectLst/>
+              </a:rPr>
+              <a:t>, </a:t>
+            </a:r>
+            <a:r>
+              <a:rPr lang="en-US" sz="1400" b="0" i="0" dirty="0">
+                <a:effectLst/>
+              </a:rPr>
+              <a:t>4.92, 5.72</a:t>
+            </a:r>
+            <a:r>
+              <a:rPr lang="en-US" sz="1400" b="0" dirty="0">
+                <a:effectLst/>
+              </a:rPr>
+              <a:t>}</a:t>
+            </a:r>
+          </a:p>
+          <a:p>
+            <a:pPr marL="1200150" lvl="2" indent="-285750">
+              <a:buFont typeface="Arial" panose="020B0604020202020204" pitchFamily="34" charset="0"/>
+              <a:buChar char="•"/>
+            </a:pPr>
+            <a:r>
+              <a:rPr lang="en-US" sz="1400" b="0" dirty="0">
+                <a:effectLst/>
+              </a:rPr>
+              <a:t>-RTlog10(</a:t>
+            </a:r>
+            <a:r>
+              <a:rPr lang="en-US" sz="1400" b="1" dirty="0"/>
+              <a:t>5.72</a:t>
+            </a:r>
+            <a:r>
+              <a:rPr lang="en-US" sz="1400" b="0" dirty="0">
+                <a:effectLst/>
+              </a:rPr>
+              <a:t>) = -4.88 kcal/mol binding free energy</a:t>
+            </a:r>
+          </a:p>
+          <a:p>
+            <a:pPr marL="1200150" lvl="2" indent="-285750">
+              <a:buFont typeface="Arial" panose="020B0604020202020204" pitchFamily="34" charset="0"/>
+              <a:buChar char="•"/>
+            </a:pPr>
+            <a:r>
+              <a:rPr lang="en-US" sz="1400" b="0" dirty="0">
+                <a:effectLst/>
+              </a:rPr>
+              <a:t>-RTlog10(</a:t>
+            </a:r>
+            <a:r>
+              <a:rPr lang="en-US" sz="1400" b="1" dirty="0">
+                <a:effectLst/>
+              </a:rPr>
+              <a:t>0.87</a:t>
+            </a:r>
+            <a:r>
+              <a:rPr lang="en-US" sz="1400" b="0" dirty="0">
+                <a:effectLst/>
+              </a:rPr>
+              <a:t>) = -5.36 kcal/mol</a:t>
+            </a:r>
+          </a:p>
+          <a:p>
+            <a:pPr marL="1200150" lvl="2" indent="-285750">
+              <a:buFont typeface="Arial" panose="020B0604020202020204" pitchFamily="34" charset="0"/>
+              <a:buChar char="•"/>
+            </a:pPr>
+            <a:r>
+              <a:rPr lang="en-US" sz="1400" b="0" dirty="0">
+                <a:effectLst/>
+              </a:rPr>
+              <a:t>for reference </a:t>
+            </a:r>
+            <a:r>
+              <a:rPr lang="en-US" sz="1400" b="0" dirty="0" err="1">
+                <a:effectLst/>
+              </a:rPr>
+              <a:t>kT</a:t>
+            </a:r>
+            <a:r>
+              <a:rPr lang="en-US" sz="1400" b="0" dirty="0">
+                <a:effectLst/>
+              </a:rPr>
+              <a:t> = 0.6 kcal/mol so this difference is on the order of </a:t>
+            </a:r>
+            <a:r>
+              <a:rPr lang="en-US" sz="1400" b="0" dirty="0" err="1">
+                <a:effectLst/>
+              </a:rPr>
+              <a:t>kT</a:t>
+            </a:r>
+            <a:endParaRPr lang="en-US" sz="1400" b="0" dirty="0">
+              <a:effectLst/>
+            </a:endParaRPr>
+          </a:p>
+          <a:p>
+            <a:pPr marL="285750" indent="-285750">
+              <a:buFont typeface="Arial" panose="020B0604020202020204" pitchFamily="34" charset="0"/>
+              <a:buChar char="•"/>
+            </a:pPr>
+            <a:endParaRPr lang="en-US" sz="1400" b="0" dirty="0">
+              <a:effectLst/>
+            </a:endParaRPr>
+          </a:p>
+          <a:p>
+            <a:pPr marL="285750" indent="-285750">
+              <a:buFont typeface="Arial" panose="020B0604020202020204" pitchFamily="34" charset="0"/>
+              <a:buChar char="•"/>
+            </a:pPr>
+            <a:endParaRPr lang="en-US" sz="1400" dirty="0"/>
+          </a:p>
+          <a:p>
+            <a:pPr marL="285750" indent="-285750">
+              <a:buFont typeface="Arial" panose="020B0604020202020204" pitchFamily="34" charset="0"/>
+              <a:buChar char="•"/>
+            </a:pPr>
+            <a:r>
+              <a:rPr lang="en-US" sz="1400" b="1" dirty="0">
+                <a:effectLst/>
+              </a:rPr>
+              <a:t>Final data set</a:t>
+            </a:r>
+            <a:r>
+              <a:rPr lang="en-US" sz="1400" b="0" dirty="0">
+                <a:effectLst/>
+              </a:rPr>
+              <a:t>:</a:t>
+            </a:r>
+          </a:p>
+          <a:p>
+            <a:pPr marL="742950" lvl="1" indent="-285750">
+              <a:buFont typeface="Arial" panose="020B0604020202020204" pitchFamily="34" charset="0"/>
+              <a:buChar char="•"/>
+            </a:pPr>
+            <a:r>
+              <a:rPr lang="en-US" sz="1400" dirty="0"/>
+              <a:t>87211 sequences</a:t>
+            </a:r>
+          </a:p>
+          <a:p>
+            <a:pPr marL="742950" lvl="1" indent="-285750">
+              <a:buFont typeface="Arial" panose="020B0604020202020204" pitchFamily="34" charset="0"/>
+              <a:buChar char="•"/>
+            </a:pPr>
+            <a:r>
+              <a:rPr lang="en-US" sz="1400" b="0" dirty="0">
+                <a:effectLst/>
+              </a:rPr>
+              <a:t>affinity will be the mean of each sequence’s multiple affinities</a:t>
+            </a:r>
+          </a:p>
+          <a:p>
+            <a:pPr marL="742950" lvl="1" indent="-285750">
+              <a:buFont typeface="Arial" panose="020B0604020202020204" pitchFamily="34" charset="0"/>
+              <a:buChar char="•"/>
+            </a:pPr>
+            <a:r>
+              <a:rPr lang="en-US" sz="1400" dirty="0"/>
+              <a:t>43 </a:t>
+            </a:r>
+            <a:r>
+              <a:rPr lang="en-US" sz="1400" dirty="0" err="1"/>
+              <a:t>Kd</a:t>
+            </a:r>
+            <a:r>
+              <a:rPr lang="en-US" sz="1400" dirty="0"/>
+              <a:t> values are negative (?!?!) : remove these.</a:t>
+            </a:r>
+          </a:p>
+          <a:p>
+            <a:pPr marL="742950" lvl="1" indent="-285750">
+              <a:buFont typeface="Arial" panose="020B0604020202020204" pitchFamily="34" charset="0"/>
+              <a:buChar char="•"/>
+            </a:pPr>
+            <a:r>
+              <a:rPr lang="en-US" sz="1400" b="0" dirty="0">
+                <a:effectLst/>
+              </a:rPr>
+              <a:t>Final row count = 87168</a:t>
+            </a:r>
+          </a:p>
+          <a:p>
+            <a:pPr marL="742950" lvl="1" indent="-285750">
+              <a:buFont typeface="Arial" panose="020B0604020202020204" pitchFamily="34" charset="0"/>
+              <a:buChar char="•"/>
+            </a:pPr>
+            <a:r>
+              <a:rPr lang="en-US" sz="1400" dirty="0"/>
+              <a:t>Train/test split 90/10: 78451/8717 rows, respectively</a:t>
+            </a:r>
+            <a:endParaRPr lang="en-US" sz="1400" b="0" dirty="0">
+              <a:effectLst/>
+            </a:endParaRPr>
+          </a:p>
+        </p:txBody>
+      </p:sp>
+      <p:sp>
+        <p:nvSpPr>
+          <p:cNvPr id="4" name="TextBox 3">
+            <a:extLst>
+              <a:ext uri="{FF2B5EF4-FFF2-40B4-BE49-F238E27FC236}">
+                <a16:creationId xmlns:a16="http://schemas.microsoft.com/office/drawing/2014/main" id="{066D4060-9E3D-9BF0-F507-08D8FA88FEE7}"/>
+              </a:ext>
+            </a:extLst>
+          </p:cNvPr>
+          <p:cNvSpPr txBox="1"/>
+          <p:nvPr/>
+        </p:nvSpPr>
+        <p:spPr>
+          <a:xfrm>
+            <a:off x="207034" y="258792"/>
+            <a:ext cx="2803585" cy="461665"/>
+          </a:xfrm>
+          <a:prstGeom prst="rect">
+            <a:avLst/>
+          </a:prstGeom>
+          <a:noFill/>
+        </p:spPr>
+        <p:txBody>
+          <a:bodyPr wrap="square" rtlCol="0">
+            <a:spAutoFit/>
+          </a:bodyPr>
+          <a:lstStyle/>
+          <a:p>
+            <a:r>
+              <a:rPr lang="en-US" sz="2400" dirty="0"/>
+              <a:t>Fine Tuning dataset</a:t>
+            </a:r>
+            <a:endParaRPr lang="en-US" sz="1600" dirty="0"/>
+          </a:p>
+        </p:txBody>
+      </p:sp>
+      <p:sp>
+        <p:nvSpPr>
+          <p:cNvPr id="5" name="TextBox 4">
+            <a:extLst>
+              <a:ext uri="{FF2B5EF4-FFF2-40B4-BE49-F238E27FC236}">
+                <a16:creationId xmlns:a16="http://schemas.microsoft.com/office/drawing/2014/main" id="{5C611D8E-C829-FF8A-3AF5-C19358C37D2B}"/>
+              </a:ext>
+            </a:extLst>
+          </p:cNvPr>
+          <p:cNvSpPr txBox="1"/>
+          <p:nvPr/>
+        </p:nvSpPr>
+        <p:spPr>
+          <a:xfrm>
+            <a:off x="379563" y="793630"/>
+            <a:ext cx="11177419" cy="369332"/>
+          </a:xfrm>
+          <a:prstGeom prst="rect">
+            <a:avLst/>
+          </a:prstGeom>
+          <a:noFill/>
+        </p:spPr>
+        <p:txBody>
+          <a:bodyPr wrap="none" rtlCol="0">
+            <a:spAutoFit/>
+          </a:bodyPr>
+          <a:lstStyle/>
+          <a:p>
+            <a:r>
+              <a:rPr lang="en-US" sz="1800" dirty="0">
+                <a:effectLst/>
+              </a:rPr>
+              <a:t>antibody_dataset_1 : the </a:t>
+            </a:r>
+            <a:r>
+              <a:rPr lang="en-US" sz="1800" dirty="0" err="1">
+                <a:effectLst/>
+              </a:rPr>
+              <a:t>scFv</a:t>
+            </a:r>
+            <a:r>
+              <a:rPr lang="en-US" sz="1800" dirty="0">
+                <a:effectLst/>
+              </a:rPr>
+              <a:t> antibody sequence/binding affinity data in the </a:t>
+            </a:r>
+            <a:r>
+              <a:rPr lang="en-US" sz="1800" dirty="0" err="1">
+                <a:effectLst/>
+              </a:rPr>
+              <a:t>AlphaSeq</a:t>
+            </a:r>
+            <a:r>
+              <a:rPr lang="en-US" sz="1800" dirty="0">
+                <a:effectLst/>
+              </a:rPr>
+              <a:t> experimental assay data</a:t>
+            </a:r>
+          </a:p>
+        </p:txBody>
+      </p:sp>
+      <p:sp>
+        <p:nvSpPr>
+          <p:cNvPr id="7" name="TextBox 6">
+            <a:extLst>
+              <a:ext uri="{FF2B5EF4-FFF2-40B4-BE49-F238E27FC236}">
+                <a16:creationId xmlns:a16="http://schemas.microsoft.com/office/drawing/2014/main" id="{1EB34716-DE6F-C17F-A2E0-42E7B410BA11}"/>
+              </a:ext>
+            </a:extLst>
+          </p:cNvPr>
+          <p:cNvSpPr txBox="1"/>
+          <p:nvPr/>
+        </p:nvSpPr>
+        <p:spPr>
+          <a:xfrm>
+            <a:off x="379563" y="6032207"/>
+            <a:ext cx="10191764" cy="461665"/>
+          </a:xfrm>
+          <a:prstGeom prst="rect">
+            <a:avLst/>
+          </a:prstGeom>
+          <a:noFill/>
+        </p:spPr>
+        <p:txBody>
+          <a:bodyPr wrap="none" rtlCol="0">
+            <a:spAutoFit/>
+          </a:bodyPr>
+          <a:lstStyle/>
+          <a:p>
+            <a:r>
+              <a:rPr lang="en-US" sz="1200" b="0" dirty="0">
+                <a:effectLst/>
+                <a:hlinkClick r:id="rId2"/>
+              </a:rPr>
+              <a:t>https://www.nature.com/articles/s41597-022-01779-4</a:t>
+            </a:r>
+            <a:endParaRPr lang="en-US" sz="1200" b="0" dirty="0">
+              <a:effectLst/>
+            </a:endParaRPr>
+          </a:p>
+          <a:p>
+            <a:r>
+              <a:rPr lang="en-US" sz="1200" b="0" dirty="0">
+                <a:effectLst/>
+              </a:rPr>
+              <a:t>"Of the 119,600 designs, 104,972 were successfully built into the </a:t>
+            </a:r>
+            <a:r>
+              <a:rPr lang="en-US" sz="1200" b="0" dirty="0" err="1">
+                <a:effectLst/>
+              </a:rPr>
+              <a:t>AlphaSeq</a:t>
+            </a:r>
+            <a:r>
+              <a:rPr lang="en-US" sz="1200" b="0" dirty="0">
+                <a:effectLst/>
+              </a:rPr>
+              <a:t> library and target binding was subsequently measured with 71,384 designs”</a:t>
+            </a:r>
+          </a:p>
+        </p:txBody>
+      </p:sp>
+    </p:spTree>
+    <p:extLst>
+      <p:ext uri="{BB962C8B-B14F-4D97-AF65-F5344CB8AC3E}">
+        <p14:creationId xmlns:p14="http://schemas.microsoft.com/office/powerpoint/2010/main" val="97067422"/>
+      </p:ext>
+    </p:extLst>
+  </p:cSld>
+  <p:clrMapOvr>
+    <a:masterClrMapping/>
+  </p:clrMapOvr>
+</p:sld>
+</file>
+
+<file path=ppt/slides/slide11.xml><?xml version="1.0" encoding="utf-8"?>
+<p:sld xmlns:a="http://schemas.openxmlformats.org/drawingml/2006/main" xmlns:r="http://schemas.openxmlformats.org/officeDocument/2006/relationships" xmlns:p="http://schemas.openxmlformats.org/presentationml/2006/main">
+  <p:cSld>
+    <p:spTree>
+      <p:nvGrpSpPr>
+        <p:cNvPr id="1" name=""/>
+        <p:cNvGrpSpPr/>
+        <p:nvPr/>
+      </p:nvGrpSpPr>
+      <p:grpSpPr>
+        <a:xfrm>
+          <a:off x="0" y="0"/>
+          <a:ext cx="0" cy="0"/>
+          <a:chOff x="0" y="0"/>
+          <a:chExt cx="0" cy="0"/>
+        </a:xfrm>
+      </p:grpSpPr>
+      <p:sp>
+        <p:nvSpPr>
           <p:cNvPr id="2" name="TextBox 1">
             <a:extLst>
               <a:ext uri="{FF2B5EF4-FFF2-40B4-BE49-F238E27FC236}">
@@ -3957,6 +4515,41 @@
           </a:p>
         </p:txBody>
       </p:sp>
+      <p:sp>
+        <p:nvSpPr>
+          <p:cNvPr id="4" name="TextBox 3">
+            <a:extLst>
+              <a:ext uri="{FF2B5EF4-FFF2-40B4-BE49-F238E27FC236}">
+                <a16:creationId xmlns:a16="http://schemas.microsoft.com/office/drawing/2014/main" id="{D5B133ED-0AD7-1D30-086B-500BFED87CF6}"/>
+              </a:ext>
+            </a:extLst>
+          </p:cNvPr>
+          <p:cNvSpPr txBox="1"/>
+          <p:nvPr/>
+        </p:nvSpPr>
+        <p:spPr>
+          <a:xfrm>
+            <a:off x="1199072" y="897147"/>
+            <a:ext cx="9251443" cy="369332"/>
+          </a:xfrm>
+          <a:prstGeom prst="rect">
+            <a:avLst/>
+          </a:prstGeom>
+          <a:noFill/>
+        </p:spPr>
+        <p:txBody>
+          <a:bodyPr wrap="none" rtlCol="0">
+            <a:spAutoFit/>
+          </a:bodyPr>
+          <a:lstStyle/>
+          <a:p>
+            <a:r>
+              <a:rPr lang="en-US" dirty="0"/>
+              <a:t>issue?   block-size = 90 during pre-training.  How to adapt for fine-tune data of longer length?</a:t>
+            </a:r>
+          </a:p>
+        </p:txBody>
+      </p:sp>
     </p:spTree>
     <p:extLst>
       <p:ext uri="{BB962C8B-B14F-4D97-AF65-F5344CB8AC3E}">
@@ -3970,7 +4563,7 @@
 </p:sld>
 </file>
 
-<file path=ppt/slides/slide11.xml><?xml version="1.0" encoding="utf-8"?>
+<file path=ppt/slides/slide12.xml><?xml version="1.0" encoding="utf-8"?>
 <p:sld xmlns:a="http://schemas.openxmlformats.org/drawingml/2006/main" xmlns:r="http://schemas.openxmlformats.org/officeDocument/2006/relationships" xmlns:p="http://schemas.openxmlformats.org/presentationml/2006/main">
   <p:cSld>
     <p:spTree>

</xml_diff>